<commit_message>
chore(misc): update svg-drawer slides file
</commit_message>
<xml_diff>
--- a/misc/svg-drawer.pptx
+++ b/misc/svg-drawer.pptx
@@ -105,6 +105,11 @@
       </a:defRPr>
     </a:lvl9pPr>
   </p:defaultTextStyle>
+  <p:extLst>
+    <p:ext uri="{EFAFB233-063F-42B5-8137-9DF3F51BA10A}">
+      <p15:sldGuideLst xmlns:p15="http://schemas.microsoft.com/office/powerpoint/2012/main"/>
+    </p:ext>
+  </p:extLst>
 </p:presentation>
 </file>
 
@@ -239,7 +244,7 @@
           <a:p>
             <a:fld id="{5EABE63F-AFDD-4647-85EE-0E2C48C805C0}" type="datetimeFigureOut">
               <a:rPr lang="zh-CN" altLang="en-US" smtClean="0"/>
-              <a:t>2023/9/18</a:t>
+              <a:t>2023/9/21</a:t>
             </a:fld>
             <a:endParaRPr lang="zh-CN" altLang="en-US"/>
           </a:p>
@@ -409,7 +414,7 @@
           <a:p>
             <a:fld id="{5EABE63F-AFDD-4647-85EE-0E2C48C805C0}" type="datetimeFigureOut">
               <a:rPr lang="zh-CN" altLang="en-US" smtClean="0"/>
-              <a:t>2023/9/18</a:t>
+              <a:t>2023/9/21</a:t>
             </a:fld>
             <a:endParaRPr lang="zh-CN" altLang="en-US"/>
           </a:p>
@@ -589,7 +594,7 @@
           <a:p>
             <a:fld id="{5EABE63F-AFDD-4647-85EE-0E2C48C805C0}" type="datetimeFigureOut">
               <a:rPr lang="zh-CN" altLang="en-US" smtClean="0"/>
-              <a:t>2023/9/18</a:t>
+              <a:t>2023/9/21</a:t>
             </a:fld>
             <a:endParaRPr lang="zh-CN" altLang="en-US"/>
           </a:p>
@@ -759,7 +764,7 @@
           <a:p>
             <a:fld id="{5EABE63F-AFDD-4647-85EE-0E2C48C805C0}" type="datetimeFigureOut">
               <a:rPr lang="zh-CN" altLang="en-US" smtClean="0"/>
-              <a:t>2023/9/18</a:t>
+              <a:t>2023/9/21</a:t>
             </a:fld>
             <a:endParaRPr lang="zh-CN" altLang="en-US"/>
           </a:p>
@@ -1003,7 +1008,7 @@
           <a:p>
             <a:fld id="{5EABE63F-AFDD-4647-85EE-0E2C48C805C0}" type="datetimeFigureOut">
               <a:rPr lang="zh-CN" altLang="en-US" smtClean="0"/>
-              <a:t>2023/9/18</a:t>
+              <a:t>2023/9/21</a:t>
             </a:fld>
             <a:endParaRPr lang="zh-CN" altLang="en-US"/>
           </a:p>
@@ -1235,7 +1240,7 @@
           <a:p>
             <a:fld id="{5EABE63F-AFDD-4647-85EE-0E2C48C805C0}" type="datetimeFigureOut">
               <a:rPr lang="zh-CN" altLang="en-US" smtClean="0"/>
-              <a:t>2023/9/18</a:t>
+              <a:t>2023/9/21</a:t>
             </a:fld>
             <a:endParaRPr lang="zh-CN" altLang="en-US"/>
           </a:p>
@@ -1602,7 +1607,7 @@
           <a:p>
             <a:fld id="{5EABE63F-AFDD-4647-85EE-0E2C48C805C0}" type="datetimeFigureOut">
               <a:rPr lang="zh-CN" altLang="en-US" smtClean="0"/>
-              <a:t>2023/9/18</a:t>
+              <a:t>2023/9/21</a:t>
             </a:fld>
             <a:endParaRPr lang="zh-CN" altLang="en-US"/>
           </a:p>
@@ -1720,7 +1725,7 @@
           <a:p>
             <a:fld id="{5EABE63F-AFDD-4647-85EE-0E2C48C805C0}" type="datetimeFigureOut">
               <a:rPr lang="zh-CN" altLang="en-US" smtClean="0"/>
-              <a:t>2023/9/18</a:t>
+              <a:t>2023/9/21</a:t>
             </a:fld>
             <a:endParaRPr lang="zh-CN" altLang="en-US"/>
           </a:p>
@@ -1815,7 +1820,7 @@
           <a:p>
             <a:fld id="{5EABE63F-AFDD-4647-85EE-0E2C48C805C0}" type="datetimeFigureOut">
               <a:rPr lang="zh-CN" altLang="en-US" smtClean="0"/>
-              <a:t>2023/9/18</a:t>
+              <a:t>2023/9/21</a:t>
             </a:fld>
             <a:endParaRPr lang="zh-CN" altLang="en-US"/>
           </a:p>
@@ -2092,7 +2097,7 @@
           <a:p>
             <a:fld id="{5EABE63F-AFDD-4647-85EE-0E2C48C805C0}" type="datetimeFigureOut">
               <a:rPr lang="zh-CN" altLang="en-US" smtClean="0"/>
-              <a:t>2023/9/18</a:t>
+              <a:t>2023/9/21</a:t>
             </a:fld>
             <a:endParaRPr lang="zh-CN" altLang="en-US"/>
           </a:p>
@@ -2349,7 +2354,7 @@
           <a:p>
             <a:fld id="{5EABE63F-AFDD-4647-85EE-0E2C48C805C0}" type="datetimeFigureOut">
               <a:rPr lang="zh-CN" altLang="en-US" smtClean="0"/>
-              <a:t>2023/9/18</a:t>
+              <a:t>2023/9/21</a:t>
             </a:fld>
             <a:endParaRPr lang="zh-CN" altLang="en-US"/>
           </a:p>
@@ -2562,7 +2567,7 @@
           <a:p>
             <a:fld id="{5EABE63F-AFDD-4647-85EE-0E2C48C805C0}" type="datetimeFigureOut">
               <a:rPr lang="zh-CN" altLang="en-US" smtClean="0"/>
-              <a:t>2023/9/18</a:t>
+              <a:t>2023/9/21</a:t>
             </a:fld>
             <a:endParaRPr lang="zh-CN" altLang="en-US"/>
           </a:p>
@@ -3229,7 +3234,7 @@
     <p:bg>
       <p:bgPr>
         <a:solidFill>
-          <a:srgbClr val="080F18"/>
+          <a:srgbClr val="1B1D1E"/>
         </a:solidFill>
         <a:effectLst/>
       </p:bgPr>
@@ -3291,7 +3296,7 @@
               </a:avLst>
             </a:prstGeom>
             <a:solidFill>
-              <a:srgbClr val="131923"/>
+              <a:srgbClr val="1E2122"/>
             </a:solidFill>
             <a:ln w="25400">
               <a:solidFill>
@@ -3320,7 +3325,7 @@
             <a:lstStyle/>
             <a:p>
               <a:pPr algn="ctr"/>
-              <a:endParaRPr lang="zh-CN" altLang="en-US"/>
+              <a:endParaRPr lang="zh-CN" altLang="en-US" dirty="0"/>
             </a:p>
           </p:txBody>
         </p:sp>
@@ -3345,7 +3350,7 @@
               <a:avLst/>
             </a:prstGeom>
             <a:solidFill>
-              <a:srgbClr val="141414"/>
+              <a:srgbClr val="181A1B"/>
             </a:solidFill>
             <a:ln w="25400">
               <a:solidFill>
@@ -3399,7 +3404,7 @@
               <a:avLst/>
             </a:prstGeom>
             <a:solidFill>
-              <a:srgbClr val="0D1117"/>
+              <a:srgbClr val="1C1E1F"/>
             </a:solidFill>
             <a:ln>
               <a:noFill/>

</xml_diff>